<commit_message>
Fix typos, um Optionale-Übung ergänzt
</commit_message>
<xml_diff>
--- a/slides/Tag-3_6-Abschluss_inkl_Aufgaben.pptx
+++ b/slides/Tag-3_6-Abschluss_inkl_Aufgaben.pptx
@@ -6,10 +6,10 @@
     <p:sldMasterId id="2147483649" r:id="rId2"/>
   </p:sldMasterIdLst>
   <p:notesMasterIdLst>
-    <p:notesMasterId r:id="rId24"/>
+    <p:notesMasterId r:id="rId23"/>
   </p:notesMasterIdLst>
   <p:handoutMasterIdLst>
-    <p:handoutMasterId r:id="rId25"/>
+    <p:handoutMasterId r:id="rId24"/>
   </p:handoutMasterIdLst>
   <p:sldIdLst>
     <p:sldId id="288" r:id="rId3"/>
@@ -31,8 +31,7 @@
     <p:sldId id="629" r:id="rId19"/>
     <p:sldId id="630" r:id="rId20"/>
     <p:sldId id="631" r:id="rId21"/>
-    <p:sldId id="636" r:id="rId22"/>
-    <p:sldId id="637" r:id="rId23"/>
+    <p:sldId id="637" r:id="rId22"/>
   </p:sldIdLst>
   <p:sldSz cx="9144000" cy="6858000" type="screen4x3"/>
   <p:notesSz cx="6784975" cy="9921875"/>
@@ -1192,7 +1191,7 @@
             <a:fld id="{18182567-388C-4D33-8B7B-A651F195F118}" type="slidenum">
               <a:rPr lang="de-DE" altLang="de-DE" smtClean="0"/>
               <a:pPr/>
-              <a:t>21</a:t>
+              <a:t>20</a:t>
             </a:fld>
             <a:endParaRPr lang="de-DE" altLang="de-DE"/>
           </a:p>
@@ -2366,7 +2365,7 @@
               <a:pPr algn="ctr">
                 <a:defRPr/>
               </a:pPr>
-              <a:t>06.06.2024</a:t>
+              <a:t>10.06.2024</a:t>
             </a:fld>
             <a:endParaRPr lang="de-DE" sz="1000">
               <a:solidFill>
@@ -5535,15 +5534,7 @@
             </a:pPr>
             <a:r>
               <a:rPr lang="de-DE" dirty="0"/>
-              <a:t>Zwei </a:t>
-            </a:r>
-            <a:r>
-              <a:rPr lang="de-DE" dirty="0" err="1"/>
-              <a:t>paralell</a:t>
-            </a:r>
-            <a:r>
-              <a:rPr lang="de-DE" dirty="0"/>
-              <a:t> laufende Tests</a:t>
+              <a:t>Zwei parallel laufende Tests</a:t>
             </a:r>
           </a:p>
           <a:p>
@@ -8227,139 +8218,115 @@
               <a:buNone/>
             </a:pPr>
             <a:r>
+              <a:rPr lang="de-DE" b="1" dirty="0"/>
+              <a:t>Optional: Komplexe Pipeline mit </a:t>
+            </a:r>
+            <a:r>
+              <a:rPr lang="de-DE" b="1" dirty="0" err="1"/>
+              <a:t>Docusaurus</a:t>
+            </a:r>
+            <a:r>
+              <a:rPr lang="de-DE" b="1" dirty="0"/>
+              <a:t> und </a:t>
+            </a:r>
+            <a:r>
+              <a:rPr lang="de-DE" b="1" dirty="0" err="1"/>
+              <a:t>npm</a:t>
+            </a:r>
+            <a:endParaRPr lang="de-DE" b="1" dirty="0"/>
+          </a:p>
+          <a:p>
+            <a:pPr marL="457200" indent="-457200">
+              <a:buFont typeface="+mj-lt"/>
+              <a:buAutoNum type="arabicPeriod"/>
+            </a:pPr>
+            <a:r>
+              <a:rPr lang="de-DE" b="1" dirty="0"/>
+              <a:t>Ziel: </a:t>
+            </a:r>
+            <a:r>
               <a:rPr lang="de-DE" dirty="0"/>
-              <a:t>Inhalt von hier übernehmen:</a:t>
-            </a:r>
+              <a:t>Tiefgehendes CI/CD Verständnis</a:t>
+            </a:r>
+          </a:p>
+          <a:p>
+            <a:pPr marL="457200" indent="-457200">
+              <a:buFont typeface="+mj-lt"/>
+              <a:buAutoNum type="arabicPeriod"/>
+            </a:pPr>
+            <a:r>
+              <a:rPr lang="de-DE" b="1" dirty="0"/>
+              <a:t>Schritte</a:t>
+            </a:r>
+          </a:p>
+          <a:p>
+            <a:pPr marL="857250" lvl="1" indent="-457200">
+              <a:buFont typeface="Arial" panose="020B0604020202020204" pitchFamily="34" charset="0"/>
+              <a:buChar char="•"/>
+            </a:pPr>
+            <a:r>
+              <a:rPr lang="de-DE" dirty="0"/>
+              <a:t>Folgen Sie den Anweisungen des </a:t>
+            </a:r>
+            <a:r>
+              <a:rPr lang="de-DE" dirty="0" err="1"/>
+              <a:t>GitLab</a:t>
+            </a:r>
+            <a:r>
+              <a:rPr lang="de-DE" dirty="0"/>
+              <a:t>-Tutorials:</a:t>
+            </a:r>
+            <a:br>
+              <a:rPr lang="de-DE" dirty="0"/>
+            </a:br>
+            <a:r>
+              <a:rPr lang="de-DE" dirty="0">
+                <a:hlinkClick r:id="rId3"/>
+              </a:rPr>
+              <a:t>https://docs.gitlab.com/ee/ci/quick_start/tutorial.html</a:t>
+            </a:r>
+            <a:r>
+              <a:rPr lang="de-DE" dirty="0"/>
+              <a:t> </a:t>
+            </a:r>
+          </a:p>
+          <a:p>
+            <a:pPr marL="857250" lvl="1" indent="-457200">
+              <a:buFont typeface="Arial" panose="020B0604020202020204" pitchFamily="34" charset="0"/>
+              <a:buChar char="•"/>
+            </a:pPr>
+            <a:r>
+              <a:rPr lang="de-DE" dirty="0"/>
+              <a:t>Beachten Sie die Voraussetzungen</a:t>
+            </a:r>
+          </a:p>
+          <a:p>
+            <a:pPr marL="1257300" lvl="2" indent="-457200">
+              <a:buFont typeface="Arial" panose="020B0604020202020204" pitchFamily="34" charset="0"/>
+              <a:buChar char="•"/>
+            </a:pPr>
+            <a:r>
+              <a:rPr lang="de-DE" sz="1800" dirty="0"/>
+              <a:t>Überprüfen Sie, ob Sie es wirklich auf GitLab.com ausführen müssen oder ob Sie die selbst gehostete Instanz </a:t>
+            </a:r>
+            <a:r>
+              <a:rPr lang="de-DE" sz="1800"/>
+              <a:t>nutzen können</a:t>
+            </a:r>
+            <a:endParaRPr lang="de-DE" sz="1800" dirty="0"/>
+          </a:p>
+          <a:p>
+            <a:pPr marL="857250" lvl="1" indent="-457200">
+              <a:buFont typeface="Arial" panose="020B0604020202020204" pitchFamily="34" charset="0"/>
+              <a:buChar char="•"/>
+            </a:pPr>
+            <a:endParaRPr lang="de-DE" dirty="0"/>
           </a:p>
           <a:p>
             <a:pPr marL="0" indent="0">
               <a:buNone/>
             </a:pPr>
-            <a:r>
-              <a:rPr lang="de-DE" dirty="0">
-                <a:hlinkClick r:id="rId2"/>
-              </a:rPr>
-              <a:t>https://docs.gitlab.com/ee/ci/quick_start/tutorial.html</a:t>
-            </a:r>
-            <a:endParaRPr lang="de-DE" dirty="0"/>
-          </a:p>
-          <a:p>
-            <a:pPr marL="0" indent="0">
-              <a:buNone/>
-            </a:pPr>
-            <a:endParaRPr lang="de-DE" dirty="0"/>
-          </a:p>
-          <a:p>
-            <a:pPr marL="0" indent="0">
-              <a:buNone/>
-            </a:pPr>
-            <a:r>
-              <a:rPr lang="de-DE" dirty="0"/>
-              <a:t>Das wird nochmal eine „komplexere“ Pipeline.</a:t>
-            </a:r>
-          </a:p>
-        </p:txBody>
-      </p:sp>
-    </p:spTree>
-    <p:extLst>
-      <p:ext uri="{BB962C8B-B14F-4D97-AF65-F5344CB8AC3E}">
-        <p14:creationId xmlns:p14="http://schemas.microsoft.com/office/powerpoint/2010/main" val="3612983727"/>
-      </p:ext>
-    </p:extLst>
-  </p:cSld>
-  <p:clrMapOvr>
-    <a:masterClrMapping/>
-  </p:clrMapOvr>
-</p:sld>
-</file>
-
-<file path=ppt/slides/slide21.xml><?xml version="1.0" encoding="utf-8"?>
-<p:sld xmlns:a="http://schemas.openxmlformats.org/drawingml/2006/main" xmlns:r="http://schemas.openxmlformats.org/officeDocument/2006/relationships" xmlns:p="http://schemas.openxmlformats.org/presentationml/2006/main">
-  <p:cSld>
-    <p:spTree>
-      <p:nvGrpSpPr>
-        <p:cNvPr id="1" name=""/>
-        <p:cNvGrpSpPr/>
-        <p:nvPr/>
-      </p:nvGrpSpPr>
-      <p:grpSpPr>
-        <a:xfrm>
-          <a:off x="0" y="0"/>
-          <a:ext cx="0" cy="0"/>
-          <a:chOff x="0" y="0"/>
-          <a:chExt cx="0" cy="0"/>
-        </a:xfrm>
-      </p:grpSpPr>
-      <p:sp>
-        <p:nvSpPr>
-          <p:cNvPr id="2" name="Titel 1">
-            <a:extLst>
-              <a:ext uri="{FF2B5EF4-FFF2-40B4-BE49-F238E27FC236}">
-                <a16:creationId xmlns:a16="http://schemas.microsoft.com/office/drawing/2014/main" id="{C68C1737-D484-715E-7DED-B4DAE0681091}"/>
-              </a:ext>
-            </a:extLst>
-          </p:cNvPr>
-          <p:cNvSpPr>
-            <a:spLocks noGrp="1"/>
-          </p:cNvSpPr>
-          <p:nvPr>
-            <p:ph type="title"/>
-          </p:nvPr>
-        </p:nvSpPr>
-        <p:spPr/>
-        <p:txBody>
-          <a:bodyPr/>
-          <a:lstStyle/>
-          <a:p>
-            <a:r>
-              <a:rPr lang="de-DE" cap="none"/>
-              <a:t>Abschlussübung &amp; Diskussion</a:t>
-            </a:r>
-            <a:endParaRPr lang="de-DE" dirty="0"/>
-          </a:p>
-        </p:txBody>
-      </p:sp>
-      <p:sp>
-        <p:nvSpPr>
-          <p:cNvPr id="3" name="Inhaltsplatzhalter 2">
-            <a:extLst>
-              <a:ext uri="{FF2B5EF4-FFF2-40B4-BE49-F238E27FC236}">
-                <a16:creationId xmlns:a16="http://schemas.microsoft.com/office/drawing/2014/main" id="{587B5FFC-7C29-4CF8-B4D6-9549918B4725}"/>
-              </a:ext>
-            </a:extLst>
-          </p:cNvPr>
-          <p:cNvSpPr>
-            <a:spLocks noGrp="1"/>
-          </p:cNvSpPr>
-          <p:nvPr>
-            <p:ph idx="1"/>
-          </p:nvPr>
-        </p:nvSpPr>
-        <p:spPr/>
-        <p:txBody>
-          <a:bodyPr/>
-          <a:lstStyle/>
-          <a:p>
-            <a:pPr marL="0" indent="0">
-              <a:buNone/>
-            </a:pPr>
-            <a:r>
-              <a:rPr lang="de-DE" dirty="0"/>
-              <a:t>Komplexe Pipeline mit </a:t>
-            </a:r>
-            <a:r>
-              <a:rPr lang="de-DE" dirty="0" err="1"/>
-              <a:t>Docusaurus</a:t>
-            </a:r>
-            <a:r>
-              <a:rPr lang="de-DE" dirty="0"/>
-              <a:t> und </a:t>
-            </a:r>
-            <a:r>
-              <a:rPr lang="de-DE" dirty="0" err="1"/>
-              <a:t>npm</a:t>
-            </a:r>
-            <a:endParaRPr lang="de-DE" dirty="0"/>
+            <a:endParaRPr lang="de-DE" b="1" dirty="0"/>
           </a:p>
         </p:txBody>
       </p:sp>
@@ -8917,7 +8884,7 @@
             </a:pPr>
             <a:r>
               <a:rPr lang="de-DE" b="1" dirty="0"/>
-              <a:t>Agenda</a:t>
+              <a:t>Inhalt</a:t>
             </a:r>
           </a:p>
           <a:p>
@@ -8947,7 +8914,7 @@
             </a:pPr>
             <a:r>
               <a:rPr lang="de-DE" dirty="0"/>
-              <a:t>Beispiel: Komplexe Pipeline mit </a:t>
+              <a:t>Optional: Komplexe Pipeline mit </a:t>
             </a:r>
             <a:r>
               <a:rPr lang="de-DE" dirty="0" err="1"/>

</xml_diff>

<commit_message>
Add Dockerfile, deploy.sh and hello-world java application
</commit_message>
<xml_diff>
--- a/slides/Tag-3_6-Abschluss_inkl_Aufgaben.pptx
+++ b/slides/Tag-3_6-Abschluss_inkl_Aufgaben.pptx
@@ -1153,7 +1153,10 @@
           <a:bodyPr/>
           <a:lstStyle/>
           <a:p>
-            <a:endParaRPr lang="de-DE" dirty="0"/>
+            <a:r>
+              <a:rPr lang="de-DE" dirty="0"/>
+              <a:t>https://docs.gitlab.com/ee/user/packages/container_registry/build_and_push_images.html#configure-your-gitlab-ciyml-file</a:t>
+            </a:r>
           </a:p>
         </p:txBody>
       </p:sp>
@@ -1195,6 +1198,446 @@
 </file>
 
 <file path=ppt/notesSlides/notesSlide12.xml><?xml version="1.0" encoding="utf-8"?>
+<p:notes xmlns:a="http://schemas.openxmlformats.org/drawingml/2006/main" xmlns:r="http://schemas.openxmlformats.org/officeDocument/2006/relationships" xmlns:p="http://schemas.openxmlformats.org/presentationml/2006/main">
+  <p:cSld>
+    <p:spTree>
+      <p:nvGrpSpPr>
+        <p:cNvPr id="1" name=""/>
+        <p:cNvGrpSpPr/>
+        <p:nvPr/>
+      </p:nvGrpSpPr>
+      <p:grpSpPr>
+        <a:xfrm>
+          <a:off x="0" y="0"/>
+          <a:ext cx="0" cy="0"/>
+          <a:chOff x="0" y="0"/>
+          <a:chExt cx="0" cy="0"/>
+        </a:xfrm>
+      </p:grpSpPr>
+      <p:sp>
+        <p:nvSpPr>
+          <p:cNvPr id="2" name="Folienbildplatzhalter 1"/>
+          <p:cNvSpPr>
+            <a:spLocks noGrp="1" noRot="1" noChangeAspect="1"/>
+          </p:cNvSpPr>
+          <p:nvPr>
+            <p:ph type="sldImg"/>
+          </p:nvPr>
+        </p:nvSpPr>
+        <p:spPr/>
+      </p:sp>
+      <p:sp>
+        <p:nvSpPr>
+          <p:cNvPr id="3" name="Notizenplatzhalter 2"/>
+          <p:cNvSpPr>
+            <a:spLocks noGrp="1"/>
+          </p:cNvSpPr>
+          <p:nvPr>
+            <p:ph type="body" idx="1"/>
+          </p:nvPr>
+        </p:nvSpPr>
+        <p:spPr/>
+        <p:txBody>
+          <a:bodyPr/>
+          <a:lstStyle/>
+          <a:p>
+            <a:r>
+              <a:rPr lang="de-DE" dirty="0"/>
+              <a:t>https://docs.gitlab.com/ee/user/packages/container_registry/build_and_push_images.html#configure-your-gitlab-ciyml-file</a:t>
+            </a:r>
+          </a:p>
+        </p:txBody>
+      </p:sp>
+      <p:sp>
+        <p:nvSpPr>
+          <p:cNvPr id="4" name="Foliennummernplatzhalter 3"/>
+          <p:cNvSpPr>
+            <a:spLocks noGrp="1"/>
+          </p:cNvSpPr>
+          <p:nvPr>
+            <p:ph type="sldNum" sz="quarter" idx="5"/>
+          </p:nvPr>
+        </p:nvSpPr>
+        <p:spPr/>
+        <p:txBody>
+          <a:bodyPr/>
+          <a:lstStyle/>
+          <a:p>
+            <a:fld id="{18182567-388C-4D33-8B7B-A651F195F118}" type="slidenum">
+              <a:rPr lang="de-DE" altLang="de-DE" smtClean="0"/>
+              <a:pPr/>
+              <a:t>15</a:t>
+            </a:fld>
+            <a:endParaRPr lang="de-DE" altLang="de-DE"/>
+          </a:p>
+        </p:txBody>
+      </p:sp>
+    </p:spTree>
+    <p:extLst>
+      <p:ext uri="{BB962C8B-B14F-4D97-AF65-F5344CB8AC3E}">
+        <p14:creationId xmlns:p14="http://schemas.microsoft.com/office/powerpoint/2010/main" val="3032088307"/>
+      </p:ext>
+    </p:extLst>
+  </p:cSld>
+  <p:clrMapOvr>
+    <a:masterClrMapping/>
+  </p:clrMapOvr>
+</p:notes>
+</file>
+
+<file path=ppt/notesSlides/notesSlide13.xml><?xml version="1.0" encoding="utf-8"?>
+<p:notes xmlns:a="http://schemas.openxmlformats.org/drawingml/2006/main" xmlns:r="http://schemas.openxmlformats.org/officeDocument/2006/relationships" xmlns:p="http://schemas.openxmlformats.org/presentationml/2006/main">
+  <p:cSld>
+    <p:spTree>
+      <p:nvGrpSpPr>
+        <p:cNvPr id="1" name=""/>
+        <p:cNvGrpSpPr/>
+        <p:nvPr/>
+      </p:nvGrpSpPr>
+      <p:grpSpPr>
+        <a:xfrm>
+          <a:off x="0" y="0"/>
+          <a:ext cx="0" cy="0"/>
+          <a:chOff x="0" y="0"/>
+          <a:chExt cx="0" cy="0"/>
+        </a:xfrm>
+      </p:grpSpPr>
+      <p:sp>
+        <p:nvSpPr>
+          <p:cNvPr id="2" name="Folienbildplatzhalter 1"/>
+          <p:cNvSpPr>
+            <a:spLocks noGrp="1" noRot="1" noChangeAspect="1"/>
+          </p:cNvSpPr>
+          <p:nvPr>
+            <p:ph type="sldImg"/>
+          </p:nvPr>
+        </p:nvSpPr>
+        <p:spPr/>
+      </p:sp>
+      <p:sp>
+        <p:nvSpPr>
+          <p:cNvPr id="3" name="Notizenplatzhalter 2"/>
+          <p:cNvSpPr>
+            <a:spLocks noGrp="1"/>
+          </p:cNvSpPr>
+          <p:nvPr>
+            <p:ph type="body" idx="1"/>
+          </p:nvPr>
+        </p:nvSpPr>
+        <p:spPr/>
+        <p:txBody>
+          <a:bodyPr/>
+          <a:lstStyle/>
+          <a:p>
+            <a:r>
+              <a:rPr lang="de-DE" dirty="0"/>
+              <a:t>https://docs.gitlab.com/ee/user/packages/container_registry/build_and_push_images.html#configure-your-gitlab-ciyml-file</a:t>
+            </a:r>
+          </a:p>
+        </p:txBody>
+      </p:sp>
+      <p:sp>
+        <p:nvSpPr>
+          <p:cNvPr id="4" name="Foliennummernplatzhalter 3"/>
+          <p:cNvSpPr>
+            <a:spLocks noGrp="1"/>
+          </p:cNvSpPr>
+          <p:nvPr>
+            <p:ph type="sldNum" sz="quarter" idx="5"/>
+          </p:nvPr>
+        </p:nvSpPr>
+        <p:spPr/>
+        <p:txBody>
+          <a:bodyPr/>
+          <a:lstStyle/>
+          <a:p>
+            <a:fld id="{18182567-388C-4D33-8B7B-A651F195F118}" type="slidenum">
+              <a:rPr lang="de-DE" altLang="de-DE" smtClean="0"/>
+              <a:pPr/>
+              <a:t>16</a:t>
+            </a:fld>
+            <a:endParaRPr lang="de-DE" altLang="de-DE"/>
+          </a:p>
+        </p:txBody>
+      </p:sp>
+    </p:spTree>
+    <p:extLst>
+      <p:ext uri="{BB962C8B-B14F-4D97-AF65-F5344CB8AC3E}">
+        <p14:creationId xmlns:p14="http://schemas.microsoft.com/office/powerpoint/2010/main" val="498585224"/>
+      </p:ext>
+    </p:extLst>
+  </p:cSld>
+  <p:clrMapOvr>
+    <a:masterClrMapping/>
+  </p:clrMapOvr>
+</p:notes>
+</file>
+
+<file path=ppt/notesSlides/notesSlide14.xml><?xml version="1.0" encoding="utf-8"?>
+<p:notes xmlns:a="http://schemas.openxmlformats.org/drawingml/2006/main" xmlns:r="http://schemas.openxmlformats.org/officeDocument/2006/relationships" xmlns:p="http://schemas.openxmlformats.org/presentationml/2006/main">
+  <p:cSld>
+    <p:spTree>
+      <p:nvGrpSpPr>
+        <p:cNvPr id="1" name=""/>
+        <p:cNvGrpSpPr/>
+        <p:nvPr/>
+      </p:nvGrpSpPr>
+      <p:grpSpPr>
+        <a:xfrm>
+          <a:off x="0" y="0"/>
+          <a:ext cx="0" cy="0"/>
+          <a:chOff x="0" y="0"/>
+          <a:chExt cx="0" cy="0"/>
+        </a:xfrm>
+      </p:grpSpPr>
+      <p:sp>
+        <p:nvSpPr>
+          <p:cNvPr id="2" name="Folienbildplatzhalter 1"/>
+          <p:cNvSpPr>
+            <a:spLocks noGrp="1" noRot="1" noChangeAspect="1"/>
+          </p:cNvSpPr>
+          <p:nvPr>
+            <p:ph type="sldImg"/>
+          </p:nvPr>
+        </p:nvSpPr>
+        <p:spPr/>
+      </p:sp>
+      <p:sp>
+        <p:nvSpPr>
+          <p:cNvPr id="3" name="Notizenplatzhalter 2"/>
+          <p:cNvSpPr>
+            <a:spLocks noGrp="1"/>
+          </p:cNvSpPr>
+          <p:nvPr>
+            <p:ph type="body" idx="1"/>
+          </p:nvPr>
+        </p:nvSpPr>
+        <p:spPr/>
+        <p:txBody>
+          <a:bodyPr/>
+          <a:lstStyle/>
+          <a:p>
+            <a:r>
+              <a:rPr lang="de-DE" dirty="0"/>
+              <a:t>https://docs.gitlab.com/ee/user/packages/container_registry/build_and_push_images.html#configure-your-gitlab-ciyml-file</a:t>
+            </a:r>
+          </a:p>
+        </p:txBody>
+      </p:sp>
+      <p:sp>
+        <p:nvSpPr>
+          <p:cNvPr id="4" name="Foliennummernplatzhalter 3"/>
+          <p:cNvSpPr>
+            <a:spLocks noGrp="1"/>
+          </p:cNvSpPr>
+          <p:nvPr>
+            <p:ph type="sldNum" sz="quarter" idx="5"/>
+          </p:nvPr>
+        </p:nvSpPr>
+        <p:spPr/>
+        <p:txBody>
+          <a:bodyPr/>
+          <a:lstStyle/>
+          <a:p>
+            <a:fld id="{18182567-388C-4D33-8B7B-A651F195F118}" type="slidenum">
+              <a:rPr lang="de-DE" altLang="de-DE" smtClean="0"/>
+              <a:pPr/>
+              <a:t>17</a:t>
+            </a:fld>
+            <a:endParaRPr lang="de-DE" altLang="de-DE"/>
+          </a:p>
+        </p:txBody>
+      </p:sp>
+    </p:spTree>
+    <p:extLst>
+      <p:ext uri="{BB962C8B-B14F-4D97-AF65-F5344CB8AC3E}">
+        <p14:creationId xmlns:p14="http://schemas.microsoft.com/office/powerpoint/2010/main" val="3674688606"/>
+      </p:ext>
+    </p:extLst>
+  </p:cSld>
+  <p:clrMapOvr>
+    <a:masterClrMapping/>
+  </p:clrMapOvr>
+</p:notes>
+</file>
+
+<file path=ppt/notesSlides/notesSlide15.xml><?xml version="1.0" encoding="utf-8"?>
+<p:notes xmlns:a="http://schemas.openxmlformats.org/drawingml/2006/main" xmlns:r="http://schemas.openxmlformats.org/officeDocument/2006/relationships" xmlns:p="http://schemas.openxmlformats.org/presentationml/2006/main">
+  <p:cSld>
+    <p:spTree>
+      <p:nvGrpSpPr>
+        <p:cNvPr id="1" name=""/>
+        <p:cNvGrpSpPr/>
+        <p:nvPr/>
+      </p:nvGrpSpPr>
+      <p:grpSpPr>
+        <a:xfrm>
+          <a:off x="0" y="0"/>
+          <a:ext cx="0" cy="0"/>
+          <a:chOff x="0" y="0"/>
+          <a:chExt cx="0" cy="0"/>
+        </a:xfrm>
+      </p:grpSpPr>
+      <p:sp>
+        <p:nvSpPr>
+          <p:cNvPr id="2" name="Folienbildplatzhalter 1"/>
+          <p:cNvSpPr>
+            <a:spLocks noGrp="1" noRot="1" noChangeAspect="1"/>
+          </p:cNvSpPr>
+          <p:nvPr>
+            <p:ph type="sldImg"/>
+          </p:nvPr>
+        </p:nvSpPr>
+        <p:spPr/>
+      </p:sp>
+      <p:sp>
+        <p:nvSpPr>
+          <p:cNvPr id="3" name="Notizenplatzhalter 2"/>
+          <p:cNvSpPr>
+            <a:spLocks noGrp="1"/>
+          </p:cNvSpPr>
+          <p:nvPr>
+            <p:ph type="body" idx="1"/>
+          </p:nvPr>
+        </p:nvSpPr>
+        <p:spPr/>
+        <p:txBody>
+          <a:bodyPr/>
+          <a:lstStyle/>
+          <a:p>
+            <a:r>
+              <a:rPr lang="de-DE" dirty="0"/>
+              <a:t>https://docs.gitlab.com/ee/user/packages/container_registry/build_and_push_images.html#configure-your-gitlab-ciyml-file</a:t>
+            </a:r>
+          </a:p>
+        </p:txBody>
+      </p:sp>
+      <p:sp>
+        <p:nvSpPr>
+          <p:cNvPr id="4" name="Foliennummernplatzhalter 3"/>
+          <p:cNvSpPr>
+            <a:spLocks noGrp="1"/>
+          </p:cNvSpPr>
+          <p:nvPr>
+            <p:ph type="sldNum" sz="quarter" idx="5"/>
+          </p:nvPr>
+        </p:nvSpPr>
+        <p:spPr/>
+        <p:txBody>
+          <a:bodyPr/>
+          <a:lstStyle/>
+          <a:p>
+            <a:fld id="{18182567-388C-4D33-8B7B-A651F195F118}" type="slidenum">
+              <a:rPr lang="de-DE" altLang="de-DE" smtClean="0"/>
+              <a:pPr/>
+              <a:t>18</a:t>
+            </a:fld>
+            <a:endParaRPr lang="de-DE" altLang="de-DE"/>
+          </a:p>
+        </p:txBody>
+      </p:sp>
+    </p:spTree>
+    <p:extLst>
+      <p:ext uri="{BB962C8B-B14F-4D97-AF65-F5344CB8AC3E}">
+        <p14:creationId xmlns:p14="http://schemas.microsoft.com/office/powerpoint/2010/main" val="1717736276"/>
+      </p:ext>
+    </p:extLst>
+  </p:cSld>
+  <p:clrMapOvr>
+    <a:masterClrMapping/>
+  </p:clrMapOvr>
+</p:notes>
+</file>
+
+<file path=ppt/notesSlides/notesSlide16.xml><?xml version="1.0" encoding="utf-8"?>
+<p:notes xmlns:a="http://schemas.openxmlformats.org/drawingml/2006/main" xmlns:r="http://schemas.openxmlformats.org/officeDocument/2006/relationships" xmlns:p="http://schemas.openxmlformats.org/presentationml/2006/main">
+  <p:cSld>
+    <p:spTree>
+      <p:nvGrpSpPr>
+        <p:cNvPr id="1" name=""/>
+        <p:cNvGrpSpPr/>
+        <p:nvPr/>
+      </p:nvGrpSpPr>
+      <p:grpSpPr>
+        <a:xfrm>
+          <a:off x="0" y="0"/>
+          <a:ext cx="0" cy="0"/>
+          <a:chOff x="0" y="0"/>
+          <a:chExt cx="0" cy="0"/>
+        </a:xfrm>
+      </p:grpSpPr>
+      <p:sp>
+        <p:nvSpPr>
+          <p:cNvPr id="2" name="Folienbildplatzhalter 1"/>
+          <p:cNvSpPr>
+            <a:spLocks noGrp="1" noRot="1" noChangeAspect="1"/>
+          </p:cNvSpPr>
+          <p:nvPr>
+            <p:ph type="sldImg"/>
+          </p:nvPr>
+        </p:nvSpPr>
+        <p:spPr/>
+      </p:sp>
+      <p:sp>
+        <p:nvSpPr>
+          <p:cNvPr id="3" name="Notizenplatzhalter 2"/>
+          <p:cNvSpPr>
+            <a:spLocks noGrp="1"/>
+          </p:cNvSpPr>
+          <p:nvPr>
+            <p:ph type="body" idx="1"/>
+          </p:nvPr>
+        </p:nvSpPr>
+        <p:spPr/>
+        <p:txBody>
+          <a:bodyPr/>
+          <a:lstStyle/>
+          <a:p>
+            <a:r>
+              <a:rPr lang="de-DE"/>
+              <a:t>https://docs.gitlab.com/ee/user/packages/container_registry/build_and_push_images.html#configure-your-gitlab-ciyml-file</a:t>
+            </a:r>
+          </a:p>
+        </p:txBody>
+      </p:sp>
+      <p:sp>
+        <p:nvSpPr>
+          <p:cNvPr id="4" name="Foliennummernplatzhalter 3"/>
+          <p:cNvSpPr>
+            <a:spLocks noGrp="1"/>
+          </p:cNvSpPr>
+          <p:nvPr>
+            <p:ph type="sldNum" sz="quarter" idx="5"/>
+          </p:nvPr>
+        </p:nvSpPr>
+        <p:spPr/>
+        <p:txBody>
+          <a:bodyPr/>
+          <a:lstStyle/>
+          <a:p>
+            <a:fld id="{18182567-388C-4D33-8B7B-A651F195F118}" type="slidenum">
+              <a:rPr lang="de-DE" altLang="de-DE" smtClean="0"/>
+              <a:pPr/>
+              <a:t>19</a:t>
+            </a:fld>
+            <a:endParaRPr lang="de-DE" altLang="de-DE"/>
+          </a:p>
+        </p:txBody>
+      </p:sp>
+    </p:spTree>
+    <p:extLst>
+      <p:ext uri="{BB962C8B-B14F-4D97-AF65-F5344CB8AC3E}">
+        <p14:creationId xmlns:p14="http://schemas.microsoft.com/office/powerpoint/2010/main" val="4204531232"/>
+      </p:ext>
+    </p:extLst>
+  </p:cSld>
+  <p:clrMapOvr>
+    <a:masterClrMapping/>
+  </p:clrMapOvr>
+</p:notes>
+</file>
+
+<file path=ppt/notesSlides/notesSlide17.xml><?xml version="1.0" encoding="utf-8"?>
 <p:notes xmlns:a="http://schemas.openxmlformats.org/drawingml/2006/main" xmlns:r="http://schemas.openxmlformats.org/officeDocument/2006/relationships" xmlns:p="http://schemas.openxmlformats.org/presentationml/2006/main">
   <p:cSld>
     <p:spTree>

</xml_diff>

<commit_message>
Remove TLS from exercise slides
</commit_message>
<xml_diff>
--- a/slides/Tag-3_6-Abschluss_inkl_Aufgaben.pptx
+++ b/slides/Tag-3_6-Abschluss_inkl_Aufgaben.pptx
@@ -2893,7 +2893,7 @@
               <a:pPr algn="ctr">
                 <a:defRPr/>
               </a:pPr>
-              <a:t>10.06.2024</a:t>
+              <a:t>11.06.2024</a:t>
             </a:fld>
             <a:endParaRPr lang="de-DE" sz="1000">
               <a:solidFill>
@@ -6928,67 +6928,16 @@
               <a:buNone/>
             </a:pPr>
             <a:r>
+              <a:rPr lang="de-DE" sz="1600">
+                <a:latin typeface="Consolas" panose="020B0609020204030204" pitchFamily="49" charset="0"/>
+              </a:rPr>
+              <a:t>  CONTAINER</a:t>
+            </a:r>
+            <a:r>
               <a:rPr lang="de-DE" sz="1600" dirty="0">
                 <a:latin typeface="Consolas" panose="020B0609020204030204" pitchFamily="49" charset="0"/>
               </a:rPr>
-              <a:t>  # Use TLS </a:t>
-            </a:r>
-            <a:r>
-              <a:rPr lang="de-DE" sz="1600" b="1" dirty="0">
-                <a:latin typeface="Consolas" panose="020B0609020204030204" pitchFamily="49" charset="0"/>
-              </a:rPr>
-              <a:t>(kein Muss!)</a:t>
-            </a:r>
-            <a:r>
-              <a:rPr lang="de-DE" sz="1600" dirty="0">
-                <a:latin typeface="Consolas" panose="020B0609020204030204" pitchFamily="49" charset="0"/>
-              </a:rPr>
-              <a:t> https://docs.gitlab.com/ee/ci/docker/using_docker_build.html#tls-enabled</a:t>
-            </a:r>
-          </a:p>
-          <a:p>
-            <a:pPr marL="0" indent="0">
-              <a:buNone/>
-            </a:pPr>
-            <a:r>
-              <a:rPr lang="de-DE" sz="1600" dirty="0">
-                <a:latin typeface="Consolas" panose="020B0609020204030204" pitchFamily="49" charset="0"/>
-              </a:rPr>
-              <a:t>  DOCKER_HOST: tcp://docker:2376</a:t>
-            </a:r>
-          </a:p>
-          <a:p>
-            <a:pPr marL="0" indent="0">
-              <a:buNone/>
-            </a:pPr>
-            <a:r>
-              <a:rPr lang="de-DE" sz="1600" dirty="0">
-                <a:latin typeface="Consolas" panose="020B0609020204030204" pitchFamily="49" charset="0"/>
-              </a:rPr>
-              <a:t>  DOCKER_TLS_CERTDIR: "/</a:t>
-            </a:r>
-            <a:r>
-              <a:rPr lang="de-DE" sz="1600" dirty="0" err="1">
-                <a:latin typeface="Consolas" panose="020B0609020204030204" pitchFamily="49" charset="0"/>
-              </a:rPr>
-              <a:t>certs</a:t>
-            </a:r>
-            <a:r>
-              <a:rPr lang="de-DE" sz="1600" dirty="0">
-                <a:latin typeface="Consolas" panose="020B0609020204030204" pitchFamily="49" charset="0"/>
-              </a:rPr>
-              <a:t>"</a:t>
-            </a:r>
-          </a:p>
-          <a:p>
-            <a:pPr marL="0" indent="0">
-              <a:buNone/>
-            </a:pPr>
-            <a:r>
-              <a:rPr lang="de-DE" sz="1600" dirty="0">
-                <a:latin typeface="Consolas" panose="020B0609020204030204" pitchFamily="49" charset="0"/>
-              </a:rPr>
-              <a:t>  CONTAINER_TEST_IMAGE: $CI_REGISTRY_IMAGE:$CI_COMMIT_REF_SLUG</a:t>
+              <a:t>_TEST_IMAGE: $CI_REGISTRY_IMAGE:$CI_COMMIT_REF_SLUG</a:t>
             </a:r>
           </a:p>
           <a:p>

</xml_diff>

<commit_message>
Müsterlösung (Pipeline) auf den Slides aktualisiert
</commit_message>
<xml_diff>
--- a/slides/Tag-3_6-Abschluss_inkl_Aufgaben.pptx
+++ b/slides/Tag-3_6-Abschluss_inkl_Aufgaben.pptx
@@ -6635,7 +6635,19 @@
               <a:rPr lang="de-DE" sz="1800" dirty="0">
                 <a:latin typeface="Consolas" panose="020B0609020204030204" pitchFamily="49" charset="0"/>
               </a:rPr>
-              <a:t>    - docker:20.10.16-dind</a:t>
+              <a:t>    - </a:t>
+            </a:r>
+            <a:r>
+              <a:rPr lang="de-DE" sz="1800" dirty="0" err="1">
+                <a:latin typeface="Consolas" panose="020B0609020204030204" pitchFamily="49" charset="0"/>
+              </a:rPr>
+              <a:t>name</a:t>
+            </a:r>
+            <a:r>
+              <a:rPr lang="de-DE" sz="1800" dirty="0">
+                <a:latin typeface="Consolas" panose="020B0609020204030204" pitchFamily="49" charset="0"/>
+              </a:rPr>
+              <a:t>: docker:20.10.16-dind</a:t>
             </a:r>
           </a:p>
           <a:p>
@@ -6646,20 +6658,17 @@
               <a:rPr lang="de-DE" sz="1800" dirty="0">
                 <a:latin typeface="Consolas" panose="020B0609020204030204" pitchFamily="49" charset="0"/>
               </a:rPr>
-              <a:t>  </a:t>
+              <a:t>      alias: </a:t>
             </a:r>
             <a:r>
               <a:rPr lang="de-DE" sz="1800" dirty="0" err="1">
                 <a:latin typeface="Consolas" panose="020B0609020204030204" pitchFamily="49" charset="0"/>
               </a:rPr>
-              <a:t>before_script</a:t>
-            </a:r>
-            <a:r>
-              <a:rPr lang="de-DE" sz="1800" dirty="0">
-                <a:latin typeface="Consolas" panose="020B0609020204030204" pitchFamily="49" charset="0"/>
-              </a:rPr>
-              <a:t>:</a:t>
-            </a:r>
+              <a:t>docker</a:t>
+            </a:r>
+            <a:endParaRPr lang="de-DE" sz="1800" dirty="0">
+              <a:latin typeface="Consolas" panose="020B0609020204030204" pitchFamily="49" charset="0"/>
+            </a:endParaRPr>
           </a:p>
           <a:p>
             <a:pPr marL="0" indent="0">
@@ -6669,6 +6678,29 @@
               <a:rPr lang="de-DE" sz="1800" dirty="0">
                 <a:latin typeface="Consolas" panose="020B0609020204030204" pitchFamily="49" charset="0"/>
               </a:rPr>
+              <a:t>  </a:t>
+            </a:r>
+            <a:r>
+              <a:rPr lang="de-DE" sz="1800" dirty="0" err="1">
+                <a:latin typeface="Consolas" panose="020B0609020204030204" pitchFamily="49" charset="0"/>
+              </a:rPr>
+              <a:t>before_script</a:t>
+            </a:r>
+            <a:r>
+              <a:rPr lang="de-DE" sz="1800" dirty="0">
+                <a:latin typeface="Consolas" panose="020B0609020204030204" pitchFamily="49" charset="0"/>
+              </a:rPr>
+              <a:t>:</a:t>
+            </a:r>
+          </a:p>
+          <a:p>
+            <a:pPr marL="0" indent="0">
+              <a:buNone/>
+            </a:pPr>
+            <a:r>
+              <a:rPr lang="de-DE" sz="1800" dirty="0">
+                <a:latin typeface="Consolas" panose="020B0609020204030204" pitchFamily="49" charset="0"/>
+              </a:rPr>
               <a:t>    - </a:t>
             </a:r>
             <a:r>
@@ -6694,6 +6726,17 @@
                 <a:latin typeface="Consolas" panose="020B0609020204030204" pitchFamily="49" charset="0"/>
               </a:rPr>
               <a:t> -u $CI_REGISTRY_USER -p $CI_REGISTRY_PASSWORD $CI_REGISTRY</a:t>
+            </a:r>
+          </a:p>
+          <a:p>
+            <a:pPr marL="0" indent="0">
+              <a:buNone/>
+            </a:pPr>
+            <a:r>
+              <a:rPr lang="de-DE" sz="1800" dirty="0">
+                <a:latin typeface="Consolas" panose="020B0609020204030204" pitchFamily="49" charset="0"/>
+              </a:rPr>
+              <a:t>    </a:t>
             </a:r>
           </a:p>
           <a:p>
@@ -6928,16 +6971,35 @@
               <a:buNone/>
             </a:pPr>
             <a:r>
-              <a:rPr lang="de-DE" sz="1600">
-                <a:latin typeface="Consolas" panose="020B0609020204030204" pitchFamily="49" charset="0"/>
-              </a:rPr>
-              <a:t>  CONTAINER</a:t>
-            </a:r>
+              <a:rPr lang="en-US" sz="1600" dirty="0">
+                <a:latin typeface="Consolas" panose="020B0609020204030204" pitchFamily="49" charset="0"/>
+              </a:rPr>
+              <a:t> # Use TLS  https://docs.gitlab.com/ee/ci/docker/using_docker_build.html#tls-enabled</a:t>
+            </a:r>
+          </a:p>
+          <a:p>
+            <a:pPr marL="0" indent="0">
+              <a:buNone/>
+            </a:pPr>
+            <a:r>
+              <a:rPr lang="en-US" sz="1600" dirty="0">
+                <a:latin typeface="Consolas" panose="020B0609020204030204" pitchFamily="49" charset="0"/>
+              </a:rPr>
+              <a:t>  DOCKER_TLS_CERTDIR: "/certs"</a:t>
+            </a:r>
+            <a:endParaRPr lang="de-DE" sz="1600" dirty="0">
+              <a:latin typeface="Consolas" panose="020B0609020204030204" pitchFamily="49" charset="0"/>
+            </a:endParaRPr>
+          </a:p>
+          <a:p>
+            <a:pPr marL="0" indent="0">
+              <a:buNone/>
+            </a:pPr>
             <a:r>
               <a:rPr lang="de-DE" sz="1600" dirty="0">
                 <a:latin typeface="Consolas" panose="020B0609020204030204" pitchFamily="49" charset="0"/>
               </a:rPr>
-              <a:t>_TEST_IMAGE: $CI_REGISTRY_IMAGE:$CI_COMMIT_REF_SLUG</a:t>
+              <a:t>  CONTAINER_TEST_IMAGE: $CI_REGISTRY_IMAGE:$CI_COMMIT_REF_SLUG</a:t>
             </a:r>
           </a:p>
           <a:p>
@@ -7398,115 +7460,58 @@
               <a:buNone/>
             </a:pPr>
             <a:r>
-              <a:rPr lang="de-DE" sz="1600" dirty="0">
-                <a:latin typeface="Consolas" panose="020B0609020204030204" pitchFamily="49" charset="0"/>
-              </a:rPr>
-              <a:t>    - </a:t>
-            </a:r>
-            <a:r>
-              <a:rPr lang="de-DE" sz="1600" dirty="0" err="1">
-                <a:latin typeface="Consolas" panose="020B0609020204030204" pitchFamily="49" charset="0"/>
-              </a:rPr>
-              <a:t>docker</a:t>
-            </a:r>
-            <a:r>
-              <a:rPr lang="de-DE" sz="1600" dirty="0">
+              <a:rPr lang="en-US" sz="1600" dirty="0">
+                <a:latin typeface="Consolas" panose="020B0609020204030204" pitchFamily="49" charset="0"/>
+              </a:rPr>
+              <a:t>    - echo 'Testing container in test 1 '# 3. Zwei </a:t>
+            </a:r>
+            <a:r>
+              <a:rPr lang="en-US" sz="1600" dirty="0" err="1">
+                <a:latin typeface="Consolas" panose="020B0609020204030204" pitchFamily="49" charset="0"/>
+              </a:rPr>
+              <a:t>paralell</a:t>
+            </a:r>
+            <a:r>
+              <a:rPr lang="en-US" sz="1600" dirty="0">
                 <a:latin typeface="Consolas" panose="020B0609020204030204" pitchFamily="49" charset="0"/>
               </a:rPr>
               <a:t> </a:t>
             </a:r>
             <a:r>
-              <a:rPr lang="de-DE" sz="1600" dirty="0" err="1">
-                <a:latin typeface="Consolas" panose="020B0609020204030204" pitchFamily="49" charset="0"/>
-              </a:rPr>
-              <a:t>run</a:t>
-            </a:r>
-            <a:r>
-              <a:rPr lang="de-DE" sz="1600" dirty="0">
-                <a:latin typeface="Consolas" panose="020B0609020204030204" pitchFamily="49" charset="0"/>
-              </a:rPr>
-              <a:t> $CONTAINER_TEST_IMAGE /</a:t>
-            </a:r>
-            <a:r>
-              <a:rPr lang="de-DE" sz="1600" dirty="0" err="1">
-                <a:latin typeface="Consolas" panose="020B0609020204030204" pitchFamily="49" charset="0"/>
-              </a:rPr>
-              <a:t>script</a:t>
-            </a:r>
-            <a:r>
-              <a:rPr lang="de-DE" sz="1600" dirty="0">
-                <a:latin typeface="Consolas" panose="020B0609020204030204" pitchFamily="49" charset="0"/>
-              </a:rPr>
-              <a:t>/</a:t>
-            </a:r>
-            <a:r>
-              <a:rPr lang="de-DE" sz="1600" dirty="0" err="1">
-                <a:latin typeface="Consolas" panose="020B0609020204030204" pitchFamily="49" charset="0"/>
-              </a:rPr>
-              <a:t>to</a:t>
-            </a:r>
-            <a:r>
-              <a:rPr lang="de-DE" sz="1600" dirty="0">
-                <a:latin typeface="Consolas" panose="020B0609020204030204" pitchFamily="49" charset="0"/>
-              </a:rPr>
-              <a:t>/</a:t>
-            </a:r>
-            <a:r>
-              <a:rPr lang="de-DE" sz="1600" dirty="0" err="1">
-                <a:latin typeface="Consolas" panose="020B0609020204030204" pitchFamily="49" charset="0"/>
-              </a:rPr>
-              <a:t>run</a:t>
-            </a:r>
-            <a:r>
-              <a:rPr lang="de-DE" sz="1600" dirty="0">
-                <a:latin typeface="Consolas" panose="020B0609020204030204" pitchFamily="49" charset="0"/>
-              </a:rPr>
-              <a:t>/</a:t>
-            </a:r>
-            <a:r>
-              <a:rPr lang="de-DE" sz="1600" dirty="0" err="1">
-                <a:latin typeface="Consolas" panose="020B0609020204030204" pitchFamily="49" charset="0"/>
-              </a:rPr>
-              <a:t>tests</a:t>
-            </a:r>
-            <a:r>
-              <a:rPr lang="de-DE" sz="1600" dirty="0">
-                <a:latin typeface="Consolas" panose="020B0609020204030204" pitchFamily="49" charset="0"/>
-              </a:rPr>
-              <a:t> </a:t>
-            </a:r>
-            <a:r>
-              <a:rPr lang="de-DE" sz="1600" dirty="0">
-                <a:solidFill>
-                  <a:srgbClr val="008C5A"/>
-                </a:solidFill>
-                <a:latin typeface="Consolas" panose="020B0609020204030204" pitchFamily="49" charset="0"/>
-              </a:rPr>
-              <a:t># 3. Zwei </a:t>
-            </a:r>
-            <a:r>
-              <a:rPr lang="de-DE" sz="1600" dirty="0" err="1">
-                <a:solidFill>
-                  <a:srgbClr val="008C5A"/>
-                </a:solidFill>
-                <a:latin typeface="Consolas" panose="020B0609020204030204" pitchFamily="49" charset="0"/>
-              </a:rPr>
-              <a:t>paralell</a:t>
-            </a:r>
-            <a:r>
-              <a:rPr lang="de-DE" sz="1600" dirty="0">
-                <a:solidFill>
-                  <a:srgbClr val="008C5A"/>
-                </a:solidFill>
-                <a:latin typeface="Consolas" panose="020B0609020204030204" pitchFamily="49" charset="0"/>
-              </a:rPr>
-              <a:t> laufende Tests</a:t>
+              <a:rPr lang="en-US" sz="1600" dirty="0" err="1">
+                <a:latin typeface="Consolas" panose="020B0609020204030204" pitchFamily="49" charset="0"/>
+              </a:rPr>
+              <a:t>laufende</a:t>
+            </a:r>
+            <a:r>
+              <a:rPr lang="en-US" sz="1600" dirty="0">
+                <a:latin typeface="Consolas" panose="020B0609020204030204" pitchFamily="49" charset="0"/>
+              </a:rPr>
+              <a:t> Tests</a:t>
             </a:r>
           </a:p>
           <a:p>
             <a:pPr marL="0" indent="0">
               <a:buNone/>
             </a:pPr>
+            <a:r>
+              <a:rPr lang="en-US" sz="1600" dirty="0">
+                <a:latin typeface="Consolas" panose="020B0609020204030204" pitchFamily="49" charset="0"/>
+              </a:rPr>
+              <a:t>    - docker run -</a:t>
+            </a:r>
+            <a:r>
+              <a:rPr lang="en-US" sz="1600" dirty="0" err="1">
+                <a:latin typeface="Consolas" panose="020B0609020204030204" pitchFamily="49" charset="0"/>
+              </a:rPr>
+              <a:t>itd</a:t>
+            </a:r>
+            <a:r>
+              <a:rPr lang="en-US" sz="1600" dirty="0">
+                <a:latin typeface="Consolas" panose="020B0609020204030204" pitchFamily="49" charset="0"/>
+              </a:rPr>
+              <a:t> -p 9090:9090 $CONTAINER_TEST_IMAGE</a:t>
+            </a:r>
             <a:endParaRPr lang="de-DE" sz="1600" dirty="0">
               <a:latin typeface="Consolas" panose="020B0609020204030204" pitchFamily="49" charset="0"/>
             </a:endParaRPr>
@@ -7629,127 +7634,58 @@
               <a:buNone/>
             </a:pPr>
             <a:r>
-              <a:rPr lang="de-DE" sz="1600" dirty="0">
-                <a:latin typeface="Consolas" panose="020B0609020204030204" pitchFamily="49" charset="0"/>
-              </a:rPr>
-              <a:t>    - </a:t>
-            </a:r>
-            <a:r>
-              <a:rPr lang="de-DE" sz="1600" dirty="0" err="1">
-                <a:latin typeface="Consolas" panose="020B0609020204030204" pitchFamily="49" charset="0"/>
-              </a:rPr>
-              <a:t>docker</a:t>
-            </a:r>
-            <a:r>
-              <a:rPr lang="de-DE" sz="1600" dirty="0">
+              <a:rPr lang="en-US" sz="1600" dirty="0">
+                <a:latin typeface="Consolas" panose="020B0609020204030204" pitchFamily="49" charset="0"/>
+              </a:rPr>
+              <a:t>    - echo 'Testing container in test 2' # 3. Zwei </a:t>
+            </a:r>
+            <a:r>
+              <a:rPr lang="en-US" sz="1600" dirty="0" err="1">
+                <a:latin typeface="Consolas" panose="020B0609020204030204" pitchFamily="49" charset="0"/>
+              </a:rPr>
+              <a:t>paralell</a:t>
+            </a:r>
+            <a:r>
+              <a:rPr lang="en-US" sz="1600" dirty="0">
                 <a:latin typeface="Consolas" panose="020B0609020204030204" pitchFamily="49" charset="0"/>
               </a:rPr>
               <a:t> </a:t>
             </a:r>
             <a:r>
-              <a:rPr lang="de-DE" sz="1600" dirty="0" err="1">
-                <a:latin typeface="Consolas" panose="020B0609020204030204" pitchFamily="49" charset="0"/>
-              </a:rPr>
-              <a:t>run</a:t>
-            </a:r>
-            <a:r>
-              <a:rPr lang="de-DE" sz="1600" dirty="0">
-                <a:latin typeface="Consolas" panose="020B0609020204030204" pitchFamily="49" charset="0"/>
-              </a:rPr>
-              <a:t> $CONTAINER_TEST_IMAGE /</a:t>
-            </a:r>
-            <a:r>
-              <a:rPr lang="de-DE" sz="1600" dirty="0" err="1">
-                <a:latin typeface="Consolas" panose="020B0609020204030204" pitchFamily="49" charset="0"/>
-              </a:rPr>
-              <a:t>script</a:t>
-            </a:r>
-            <a:r>
-              <a:rPr lang="de-DE" sz="1600" dirty="0">
-                <a:latin typeface="Consolas" panose="020B0609020204030204" pitchFamily="49" charset="0"/>
-              </a:rPr>
-              <a:t>/</a:t>
-            </a:r>
-            <a:r>
-              <a:rPr lang="de-DE" sz="1600" dirty="0" err="1">
-                <a:latin typeface="Consolas" panose="020B0609020204030204" pitchFamily="49" charset="0"/>
-              </a:rPr>
-              <a:t>to</a:t>
-            </a:r>
-            <a:r>
-              <a:rPr lang="de-DE" sz="1600" dirty="0">
-                <a:latin typeface="Consolas" panose="020B0609020204030204" pitchFamily="49" charset="0"/>
-              </a:rPr>
-              <a:t>/</a:t>
-            </a:r>
-            <a:r>
-              <a:rPr lang="de-DE" sz="1600" dirty="0" err="1">
-                <a:latin typeface="Consolas" panose="020B0609020204030204" pitchFamily="49" charset="0"/>
-              </a:rPr>
-              <a:t>run</a:t>
-            </a:r>
-            <a:r>
-              <a:rPr lang="de-DE" sz="1600" dirty="0">
-                <a:latin typeface="Consolas" panose="020B0609020204030204" pitchFamily="49" charset="0"/>
-              </a:rPr>
-              <a:t>/</a:t>
-            </a:r>
-            <a:r>
-              <a:rPr lang="de-DE" sz="1600" dirty="0" err="1">
-                <a:latin typeface="Consolas" panose="020B0609020204030204" pitchFamily="49" charset="0"/>
-              </a:rPr>
-              <a:t>another</a:t>
-            </a:r>
-            <a:r>
-              <a:rPr lang="de-DE" sz="1600" dirty="0">
-                <a:latin typeface="Consolas" panose="020B0609020204030204" pitchFamily="49" charset="0"/>
-              </a:rPr>
-              <a:t>/</a:t>
-            </a:r>
-            <a:r>
-              <a:rPr lang="de-DE" sz="1600" dirty="0" err="1">
-                <a:latin typeface="Consolas" panose="020B0609020204030204" pitchFamily="49" charset="0"/>
-              </a:rPr>
-              <a:t>test</a:t>
-            </a:r>
-            <a:r>
-              <a:rPr lang="de-DE" sz="1600" dirty="0">
-                <a:latin typeface="Consolas" panose="020B0609020204030204" pitchFamily="49" charset="0"/>
-              </a:rPr>
-              <a:t> </a:t>
-            </a:r>
-            <a:r>
-              <a:rPr lang="de-DE" sz="1600" dirty="0">
-                <a:solidFill>
-                  <a:srgbClr val="008C5A"/>
-                </a:solidFill>
-                <a:latin typeface="Consolas" panose="020B0609020204030204" pitchFamily="49" charset="0"/>
-              </a:rPr>
-              <a:t># 3. Zwei </a:t>
-            </a:r>
-            <a:r>
-              <a:rPr lang="de-DE" sz="1600" dirty="0" err="1">
-                <a:solidFill>
-                  <a:srgbClr val="008C5A"/>
-                </a:solidFill>
-                <a:latin typeface="Consolas" panose="020B0609020204030204" pitchFamily="49" charset="0"/>
-              </a:rPr>
-              <a:t>paralell</a:t>
-            </a:r>
-            <a:r>
-              <a:rPr lang="de-DE" sz="1600" dirty="0">
-                <a:solidFill>
-                  <a:srgbClr val="008C5A"/>
-                </a:solidFill>
-                <a:latin typeface="Consolas" panose="020B0609020204030204" pitchFamily="49" charset="0"/>
-              </a:rPr>
-              <a:t> laufende Tests</a:t>
+              <a:rPr lang="en-US" sz="1600" dirty="0" err="1">
+                <a:latin typeface="Consolas" panose="020B0609020204030204" pitchFamily="49" charset="0"/>
+              </a:rPr>
+              <a:t>laufende</a:t>
+            </a:r>
+            <a:r>
+              <a:rPr lang="en-US" sz="1600" dirty="0">
+                <a:latin typeface="Consolas" panose="020B0609020204030204" pitchFamily="49" charset="0"/>
+              </a:rPr>
+              <a:t> Tests</a:t>
             </a:r>
           </a:p>
           <a:p>
             <a:pPr marL="0" indent="0">
               <a:buNone/>
             </a:pPr>
+            <a:r>
+              <a:rPr lang="en-US" sz="1600" dirty="0">
+                <a:latin typeface="Consolas" panose="020B0609020204030204" pitchFamily="49" charset="0"/>
+              </a:rPr>
+              <a:t>    - docker run -</a:t>
+            </a:r>
+            <a:r>
+              <a:rPr lang="en-US" sz="1600" dirty="0" err="1">
+                <a:latin typeface="Consolas" panose="020B0609020204030204" pitchFamily="49" charset="0"/>
+              </a:rPr>
+              <a:t>itd</a:t>
+            </a:r>
+            <a:r>
+              <a:rPr lang="en-US" sz="1600" dirty="0">
+                <a:latin typeface="Consolas" panose="020B0609020204030204" pitchFamily="49" charset="0"/>
+              </a:rPr>
+              <a:t> -p 9091:9090 $CONTAINER_TEST_IMAGE</a:t>
+            </a:r>
             <a:endParaRPr lang="de-DE" sz="1600" dirty="0">
               <a:latin typeface="Consolas" panose="020B0609020204030204" pitchFamily="49" charset="0"/>
             </a:endParaRPr>
@@ -8222,6 +8158,29 @@
                 <a:latin typeface="Consolas" panose="020B0609020204030204" pitchFamily="49" charset="0"/>
               </a:rPr>
               <a:t>:</a:t>
+            </a:r>
+          </a:p>
+          <a:p>
+            <a:pPr marL="0" indent="0">
+              <a:buNone/>
+            </a:pPr>
+            <a:r>
+              <a:rPr lang="de-DE" sz="1400" dirty="0">
+                <a:latin typeface="Consolas" panose="020B0609020204030204" pitchFamily="49" charset="0"/>
+              </a:rPr>
+              <a:t>    - </a:t>
+            </a:r>
+            <a:r>
+              <a:rPr lang="de-DE" sz="1400" dirty="0" err="1">
+                <a:latin typeface="Consolas" panose="020B0609020204030204" pitchFamily="49" charset="0"/>
+              </a:rPr>
+              <a:t>chmod</a:t>
+            </a:r>
+            <a:r>
+              <a:rPr lang="de-DE" sz="1400" dirty="0">
+                <a:latin typeface="Consolas" panose="020B0609020204030204" pitchFamily="49" charset="0"/>
+              </a:rPr>
+              <a:t> +x ./deploy.sh</a:t>
             </a:r>
           </a:p>
           <a:p>

</xml_diff>

<commit_message>
Abschlussübung letzten Satz entfernt, da dieser gefragt hat, ob man auf GitLab.com oder auf einer selbst gehosteten Instanz arbeiten muss/soll. Wir arbeiten auf GitLab.com bei der Schulung.
</commit_message>
<xml_diff>
--- a/slides/Tag-3_6-Abschluss_inkl_Aufgaben.pptx
+++ b/slides/Tag-3_6-Abschluss_inkl_Aufgaben.pptx
@@ -2976,7 +2976,7 @@
               <a:pPr algn="ctr">
                 <a:defRPr/>
               </a:pPr>
-              <a:t>12.06.2024</a:t>
+              <a:t>14.06.2024</a:t>
             </a:fld>
             <a:endParaRPr lang="de-DE" sz="1000">
               <a:solidFill>
@@ -9017,24 +9017,12 @@
             </a:pPr>
             <a:r>
               <a:rPr lang="de-DE" dirty="0"/>
-              <a:t>Beachten Sie die Voraussetzungen</a:t>
-            </a:r>
-          </a:p>
-          <a:p>
-            <a:pPr marL="1257300" lvl="2" indent="-457200">
-              <a:buFont typeface="Arial" panose="020B0604020202020204" pitchFamily="34" charset="0"/>
-              <a:buChar char="•"/>
-            </a:pPr>
-            <a:r>
-              <a:rPr lang="de-DE" sz="1800" dirty="0"/>
-              <a:t>Überprüfen Sie, ob Sie es wirklich auf GitLab.com ausführen müssen oder ob Sie die selbst gehostete Instanz nutzen können</a:t>
-            </a:r>
-          </a:p>
-          <a:p>
-            <a:pPr marL="857250" lvl="1" indent="-457200">
-              <a:buFont typeface="Arial" panose="020B0604020202020204" pitchFamily="34" charset="0"/>
-              <a:buChar char="•"/>
-            </a:pPr>
+              <a:t>Beachten Sie </a:t>
+            </a:r>
+            <a:r>
+              <a:rPr lang="de-DE"/>
+              <a:t>die Voraussetzungen</a:t>
+            </a:r>
             <a:endParaRPr lang="de-DE" dirty="0"/>
           </a:p>
           <a:p>

</xml_diff>